<commit_message>
fixed transversal gates issue
</commit_message>
<xml_diff>
--- a/Shor_algo_presentation_Gusarov.pptx
+++ b/Shor_algo_presentation_Gusarov.pptx
@@ -11,16 +11,17 @@
     <p:sldId id="266" r:id="rId5"/>
     <p:sldId id="264" r:id="rId6"/>
     <p:sldId id="265" r:id="rId7"/>
-    <p:sldId id="260" r:id="rId8"/>
-    <p:sldId id="258" r:id="rId9"/>
-    <p:sldId id="261" r:id="rId10"/>
-    <p:sldId id="259" r:id="rId11"/>
-    <p:sldId id="268" r:id="rId12"/>
-    <p:sldId id="263" r:id="rId13"/>
-    <p:sldId id="262" r:id="rId14"/>
-    <p:sldId id="269" r:id="rId15"/>
-    <p:sldId id="270" r:id="rId16"/>
-    <p:sldId id="271" r:id="rId17"/>
+    <p:sldId id="272" r:id="rId8"/>
+    <p:sldId id="260" r:id="rId9"/>
+    <p:sldId id="258" r:id="rId10"/>
+    <p:sldId id="261" r:id="rId11"/>
+    <p:sldId id="259" r:id="rId12"/>
+    <p:sldId id="268" r:id="rId13"/>
+    <p:sldId id="263" r:id="rId14"/>
+    <p:sldId id="262" r:id="rId15"/>
+    <p:sldId id="269" r:id="rId16"/>
+    <p:sldId id="270" r:id="rId17"/>
+    <p:sldId id="271" r:id="rId18"/>
   </p:sldIdLst>
   <p:sldSz cx="12192000" cy="6858000"/>
   <p:notesSz cx="6858000" cy="9144000"/>
@@ -119,6 +120,11 @@
       </a:defRPr>
     </a:lvl9pPr>
   </p:defaultTextStyle>
+  <p:extLst>
+    <p:ext uri="{EFAFB233-063F-42B5-8137-9DF3F51BA10A}">
+      <p15:sldGuideLst xmlns:p15="http://schemas.microsoft.com/office/powerpoint/2012/main"/>
+    </p:ext>
+  </p:extLst>
 </p:presentation>
 </file>
 
@@ -271,7 +277,7 @@
           <a:p>
             <a:fld id="{F3B253E9-E339-9B43-8075-DACB456923C3}" type="datetimeFigureOut">
               <a:rPr lang="en-US" smtClean="0"/>
-              <a:t>12/26/24</a:t>
+              <a:t>1/12/25</a:t>
             </a:fld>
             <a:endParaRPr lang="en-US"/>
           </a:p>
@@ -471,7 +477,7 @@
           <a:p>
             <a:fld id="{F3B253E9-E339-9B43-8075-DACB456923C3}" type="datetimeFigureOut">
               <a:rPr lang="en-US" smtClean="0"/>
-              <a:t>12/26/24</a:t>
+              <a:t>1/12/25</a:t>
             </a:fld>
             <a:endParaRPr lang="en-US"/>
           </a:p>
@@ -681,7 +687,7 @@
           <a:p>
             <a:fld id="{F3B253E9-E339-9B43-8075-DACB456923C3}" type="datetimeFigureOut">
               <a:rPr lang="en-US" smtClean="0"/>
-              <a:t>12/26/24</a:t>
+              <a:t>1/12/25</a:t>
             </a:fld>
             <a:endParaRPr lang="en-US"/>
           </a:p>
@@ -881,7 +887,7 @@
           <a:p>
             <a:fld id="{F3B253E9-E339-9B43-8075-DACB456923C3}" type="datetimeFigureOut">
               <a:rPr lang="en-US" smtClean="0"/>
-              <a:t>12/26/24</a:t>
+              <a:t>1/12/25</a:t>
             </a:fld>
             <a:endParaRPr lang="en-US"/>
           </a:p>
@@ -1157,7 +1163,7 @@
           <a:p>
             <a:fld id="{F3B253E9-E339-9B43-8075-DACB456923C3}" type="datetimeFigureOut">
               <a:rPr lang="en-US" smtClean="0"/>
-              <a:t>12/26/24</a:t>
+              <a:t>1/12/25</a:t>
             </a:fld>
             <a:endParaRPr lang="en-US"/>
           </a:p>
@@ -1425,7 +1431,7 @@
           <a:p>
             <a:fld id="{F3B253E9-E339-9B43-8075-DACB456923C3}" type="datetimeFigureOut">
               <a:rPr lang="en-US" smtClean="0"/>
-              <a:t>12/26/24</a:t>
+              <a:t>1/12/25</a:t>
             </a:fld>
             <a:endParaRPr lang="en-US"/>
           </a:p>
@@ -1840,7 +1846,7 @@
           <a:p>
             <a:fld id="{F3B253E9-E339-9B43-8075-DACB456923C3}" type="datetimeFigureOut">
               <a:rPr lang="en-US" smtClean="0"/>
-              <a:t>12/26/24</a:t>
+              <a:t>1/12/25</a:t>
             </a:fld>
             <a:endParaRPr lang="en-US"/>
           </a:p>
@@ -1982,7 +1988,7 @@
           <a:p>
             <a:fld id="{F3B253E9-E339-9B43-8075-DACB456923C3}" type="datetimeFigureOut">
               <a:rPr lang="en-US" smtClean="0"/>
-              <a:t>12/26/24</a:t>
+              <a:t>1/12/25</a:t>
             </a:fld>
             <a:endParaRPr lang="en-US"/>
           </a:p>
@@ -2095,7 +2101,7 @@
           <a:p>
             <a:fld id="{F3B253E9-E339-9B43-8075-DACB456923C3}" type="datetimeFigureOut">
               <a:rPr lang="en-US" smtClean="0"/>
-              <a:t>12/26/24</a:t>
+              <a:t>1/12/25</a:t>
             </a:fld>
             <a:endParaRPr lang="en-US"/>
           </a:p>
@@ -2408,7 +2414,7 @@
           <a:p>
             <a:fld id="{F3B253E9-E339-9B43-8075-DACB456923C3}" type="datetimeFigureOut">
               <a:rPr lang="en-US" smtClean="0"/>
-              <a:t>12/26/24</a:t>
+              <a:t>1/12/25</a:t>
             </a:fld>
             <a:endParaRPr lang="en-US"/>
           </a:p>
@@ -2697,7 +2703,7 @@
           <a:p>
             <a:fld id="{F3B253E9-E339-9B43-8075-DACB456923C3}" type="datetimeFigureOut">
               <a:rPr lang="en-US" smtClean="0"/>
-              <a:t>12/26/24</a:t>
+              <a:t>1/12/25</a:t>
             </a:fld>
             <a:endParaRPr lang="en-US"/>
           </a:p>
@@ -2940,7 +2946,7 @@
           <a:p>
             <a:fld id="{F3B253E9-E339-9B43-8075-DACB456923C3}" type="datetimeFigureOut">
               <a:rPr lang="en-US" smtClean="0"/>
-              <a:t>12/26/24</a:t>
+              <a:t>1/12/25</a:t>
             </a:fld>
             <a:endParaRPr lang="en-US"/>
           </a:p>
@@ -3457,6 +3463,122 @@
           <p:cNvPr id="2" name="Title 1">
             <a:extLst>
               <a:ext uri="{FF2B5EF4-FFF2-40B4-BE49-F238E27FC236}">
+                <a16:creationId xmlns:a16="http://schemas.microsoft.com/office/drawing/2014/main" id="{D3E941D2-CC56-25E0-32A2-B13AEE5825DB}"/>
+              </a:ext>
+            </a:extLst>
+          </p:cNvPr>
+          <p:cNvSpPr>
+            <a:spLocks noGrp="1"/>
+          </p:cNvSpPr>
+          <p:nvPr>
+            <p:ph type="title"/>
+          </p:nvPr>
+        </p:nvSpPr>
+        <p:spPr/>
+        <p:txBody>
+          <a:bodyPr/>
+          <a:lstStyle/>
+          <a:p>
+            <a:r>
+              <a:rPr lang="en-US" dirty="0"/>
+              <a:t>Correctable errors 3/4</a:t>
+            </a:r>
+          </a:p>
+        </p:txBody>
+      </p:sp>
+      <p:sp>
+        <p:nvSpPr>
+          <p:cNvPr id="3" name="Content Placeholder 2">
+            <a:extLst>
+              <a:ext uri="{FF2B5EF4-FFF2-40B4-BE49-F238E27FC236}">
+                <a16:creationId xmlns:a16="http://schemas.microsoft.com/office/drawing/2014/main" id="{49605DB2-4072-BE93-38B8-A348007E9394}"/>
+              </a:ext>
+            </a:extLst>
+          </p:cNvPr>
+          <p:cNvSpPr>
+            <a:spLocks noGrp="1"/>
+          </p:cNvSpPr>
+          <p:nvPr>
+            <p:ph idx="1"/>
+          </p:nvPr>
+        </p:nvSpPr>
+        <p:spPr/>
+        <p:txBody>
+          <a:bodyPr/>
+          <a:lstStyle/>
+          <a:p>
+            <a:r>
+              <a:rPr lang="en-US" dirty="0"/>
+              <a:t>X in different blocks (up to 3)</a:t>
+            </a:r>
+          </a:p>
+        </p:txBody>
+      </p:sp>
+      <p:pic>
+        <p:nvPicPr>
+          <p:cNvPr id="4" name="Picture 3">
+            <a:extLst>
+              <a:ext uri="{FF2B5EF4-FFF2-40B4-BE49-F238E27FC236}">
+                <a16:creationId xmlns:a16="http://schemas.microsoft.com/office/drawing/2014/main" id="{92581A41-4BDA-14DF-09C7-568F75C73326}"/>
+              </a:ext>
+            </a:extLst>
+          </p:cNvPr>
+          <p:cNvPicPr>
+            <a:picLocks noChangeAspect="1"/>
+          </p:cNvPicPr>
+          <p:nvPr/>
+        </p:nvPicPr>
+        <p:blipFill>
+          <a:blip r:embed="rId2"/>
+          <a:stretch>
+            <a:fillRect/>
+          </a:stretch>
+        </p:blipFill>
+        <p:spPr>
+          <a:xfrm>
+            <a:off x="4419600" y="2524604"/>
+            <a:ext cx="7772400" cy="4333396"/>
+          </a:xfrm>
+          <a:prstGeom prst="rect">
+            <a:avLst/>
+          </a:prstGeom>
+        </p:spPr>
+      </p:pic>
+    </p:spTree>
+    <p:extLst>
+      <p:ext uri="{BB962C8B-B14F-4D97-AF65-F5344CB8AC3E}">
+        <p14:creationId xmlns:p14="http://schemas.microsoft.com/office/powerpoint/2010/main" val="2344972671"/>
+      </p:ext>
+    </p:extLst>
+  </p:cSld>
+  <p:clrMapOvr>
+    <a:masterClrMapping/>
+  </p:clrMapOvr>
+</p:sld>
+</file>
+
+<file path=ppt/slides/slide11.xml><?xml version="1.0" encoding="utf-8"?>
+<p:sld xmlns:a="http://schemas.openxmlformats.org/drawingml/2006/main" xmlns:r="http://schemas.openxmlformats.org/officeDocument/2006/relationships" xmlns:p="http://schemas.openxmlformats.org/presentationml/2006/main">
+  <p:cSld>
+    <p:spTree>
+      <p:nvGrpSpPr>
+        <p:cNvPr id="1" name=""/>
+        <p:cNvGrpSpPr/>
+        <p:nvPr/>
+      </p:nvGrpSpPr>
+      <p:grpSpPr>
+        <a:xfrm>
+          <a:off x="0" y="0"/>
+          <a:ext cx="0" cy="0"/>
+          <a:chOff x="0" y="0"/>
+          <a:chExt cx="0" cy="0"/>
+        </a:xfrm>
+      </p:grpSpPr>
+      <p:sp>
+        <p:nvSpPr>
+          <p:cNvPr id="2" name="Title 1">
+            <a:extLst>
+              <a:ext uri="{FF2B5EF4-FFF2-40B4-BE49-F238E27FC236}">
                 <a16:creationId xmlns:a16="http://schemas.microsoft.com/office/drawing/2014/main" id="{FF6DCAC5-2D1E-AF8F-D7E0-DABF17E53907}"/>
               </a:ext>
             </a:extLst>
@@ -3551,7 +3673,7 @@
 </p:sld>
 </file>
 
-<file path=ppt/slides/slide11.xml><?xml version="1.0" encoding="utf-8"?>
+<file path=ppt/slides/slide12.xml><?xml version="1.0" encoding="utf-8"?>
 <p:sld xmlns:a="http://schemas.openxmlformats.org/drawingml/2006/main" xmlns:r="http://schemas.openxmlformats.org/officeDocument/2006/relationships" xmlns:p="http://schemas.openxmlformats.org/presentationml/2006/main">
   <p:cSld>
     <p:spTree>
@@ -3664,7 +3786,7 @@
 </p:sld>
 </file>
 
-<file path=ppt/slides/slide12.xml><?xml version="1.0" encoding="utf-8"?>
+<file path=ppt/slides/slide13.xml><?xml version="1.0" encoding="utf-8"?>
 <p:sld xmlns:a="http://schemas.openxmlformats.org/drawingml/2006/main" xmlns:r="http://schemas.openxmlformats.org/officeDocument/2006/relationships" xmlns:p="http://schemas.openxmlformats.org/presentationml/2006/main">
   <p:cSld>
     <p:spTree>
@@ -3811,7 +3933,7 @@
 </p:sld>
 </file>
 
-<file path=ppt/slides/slide13.xml><?xml version="1.0" encoding="utf-8"?>
+<file path=ppt/slides/slide14.xml><?xml version="1.0" encoding="utf-8"?>
 <p:sld xmlns:a="http://schemas.openxmlformats.org/drawingml/2006/main" xmlns:r="http://schemas.openxmlformats.org/officeDocument/2006/relationships" xmlns:p="http://schemas.openxmlformats.org/presentationml/2006/main">
   <p:cSld>
     <p:spTree>
@@ -3962,7 +4084,7 @@
 </p:sld>
 </file>
 
-<file path=ppt/slides/slide14.xml><?xml version="1.0" encoding="utf-8"?>
+<file path=ppt/slides/slide15.xml><?xml version="1.0" encoding="utf-8"?>
 <p:sld xmlns:a="http://schemas.openxmlformats.org/drawingml/2006/main" xmlns:r="http://schemas.openxmlformats.org/officeDocument/2006/relationships" xmlns:p="http://schemas.openxmlformats.org/presentationml/2006/main">
   <p:cSld>
     <p:spTree>
@@ -4105,7 +4227,7 @@
 </p:sld>
 </file>
 
-<file path=ppt/slides/slide15.xml><?xml version="1.0" encoding="utf-8"?>
+<file path=ppt/slides/slide16.xml><?xml version="1.0" encoding="utf-8"?>
 <p:sld xmlns:a="http://schemas.openxmlformats.org/drawingml/2006/main" xmlns:r="http://schemas.openxmlformats.org/officeDocument/2006/relationships" xmlns:p="http://schemas.openxmlformats.org/presentationml/2006/main">
   <p:cSld>
     <p:spTree>
@@ -4218,7 +4340,7 @@
 </p:sld>
 </file>
 
-<file path=ppt/slides/slide16.xml><?xml version="1.0" encoding="utf-8"?>
+<file path=ppt/slides/slide17.xml><?xml version="1.0" encoding="utf-8"?>
 <p:sld xmlns:a="http://schemas.openxmlformats.org/drawingml/2006/main" xmlns:r="http://schemas.openxmlformats.org/officeDocument/2006/relationships" xmlns:p="http://schemas.openxmlformats.org/presentationml/2006/main">
   <p:cSld>
     <p:spTree>
@@ -4505,8 +4627,8 @@
           </a:p>
         </p:txBody>
       </p:sp>
-      <mc:AlternateContent xmlns:mc="http://schemas.openxmlformats.org/markup-compatibility/2006">
-        <mc:Choice xmlns:a14="http://schemas.microsoft.com/office/drawing/2010/main" Requires="a14">
+      <mc:AlternateContent xmlns:mc="http://schemas.openxmlformats.org/markup-compatibility/2006" xmlns:a14="http://schemas.microsoft.com/office/drawing/2010/main">
+        <mc:Choice Requires="a14">
           <p:sp>
             <p:nvSpPr>
               <p:cNvPr id="3" name="Content Placeholder 2">
@@ -4875,7 +4997,7 @@
             </p:txBody>
           </p:sp>
         </mc:Choice>
-        <mc:Fallback>
+        <mc:Fallback xmlns="">
           <p:sp>
             <p:nvSpPr>
               <p:cNvPr id="3" name="Content Placeholder 2">
@@ -4973,8 +5095,8 @@
           </a:p>
         </p:txBody>
       </p:sp>
-      <mc:AlternateContent xmlns:mc="http://schemas.openxmlformats.org/markup-compatibility/2006">
-        <mc:Choice xmlns:a14="http://schemas.microsoft.com/office/drawing/2010/main" Requires="a14">
+      <mc:AlternateContent xmlns:mc="http://schemas.openxmlformats.org/markup-compatibility/2006" xmlns:a14="http://schemas.microsoft.com/office/drawing/2010/main">
+        <mc:Choice Requires="a14">
           <p:sp>
             <p:nvSpPr>
               <p:cNvPr id="3" name="Content Placeholder 2">
@@ -5702,7 +5824,7 @@
             </p:txBody>
           </p:sp>
         </mc:Choice>
-        <mc:Fallback>
+        <mc:Fallback xmlns="">
           <p:sp>
             <p:nvSpPr>
               <p:cNvPr id="3" name="Content Placeholder 2">
@@ -6181,7 +6303,7 @@
           <a:p>
             <a:r>
               <a:rPr lang="en-US" dirty="0"/>
-              <a:t>Transversal gates</a:t>
+              <a:t>Transversal gates 1/2</a:t>
             </a:r>
           </a:p>
         </p:txBody>
@@ -6208,18 +6330,22 @@
           <a:lstStyle/>
           <a:p>
             <a:r>
+              <a:rPr lang="en-US" b="1" dirty="0"/>
+              <a:t>X</a:t>
+            </a:r>
+            <a:r>
               <a:rPr lang="en-US" dirty="0"/>
-              <a:t>Gates applied transversally change the state as expected</a:t>
+              <a:t> : flipping phase in each group to flip the codewords</a:t>
             </a:r>
           </a:p>
         </p:txBody>
       </p:sp>
       <p:pic>
         <p:nvPicPr>
-          <p:cNvPr id="4" name="Picture 3">
-            <a:extLst>
-              <a:ext uri="{FF2B5EF4-FFF2-40B4-BE49-F238E27FC236}">
-                <a16:creationId xmlns:a16="http://schemas.microsoft.com/office/drawing/2014/main" id="{116DDB88-DA7F-7A20-3DC0-7F77C6BB30C5}"/>
+          <p:cNvPr id="7" name="Picture 6">
+            <a:extLst>
+              <a:ext uri="{FF2B5EF4-FFF2-40B4-BE49-F238E27FC236}">
+                <a16:creationId xmlns:a16="http://schemas.microsoft.com/office/drawing/2014/main" id="{6BF14931-EFF5-47DC-66DE-EF1228C0EFA9}"/>
               </a:ext>
             </a:extLst>
           </p:cNvPr>
@@ -6236,8 +6362,8 @@
         </p:blipFill>
         <p:spPr>
           <a:xfrm>
-            <a:off x="4419600" y="2496327"/>
-            <a:ext cx="7772400" cy="4361673"/>
+            <a:off x="3601844" y="2304820"/>
+            <a:ext cx="8590156" cy="4553180"/>
           </a:xfrm>
           <a:prstGeom prst="rect">
             <a:avLst/>
@@ -6279,6 +6405,145 @@
           <p:cNvPr id="2" name="Title 1">
             <a:extLst>
               <a:ext uri="{FF2B5EF4-FFF2-40B4-BE49-F238E27FC236}">
+                <a16:creationId xmlns:a16="http://schemas.microsoft.com/office/drawing/2014/main" id="{2E30ADE9-2A83-5F8F-BAE1-C3732AC3350B}"/>
+              </a:ext>
+            </a:extLst>
+          </p:cNvPr>
+          <p:cNvSpPr>
+            <a:spLocks noGrp="1"/>
+          </p:cNvSpPr>
+          <p:nvPr>
+            <p:ph type="title"/>
+          </p:nvPr>
+        </p:nvSpPr>
+        <p:spPr/>
+        <p:txBody>
+          <a:bodyPr/>
+          <a:lstStyle/>
+          <a:p>
+            <a:r>
+              <a:rPr lang="en-US" dirty="0"/>
+              <a:t>Transversal gates 2/2</a:t>
+            </a:r>
+          </a:p>
+        </p:txBody>
+      </p:sp>
+      <p:sp>
+        <p:nvSpPr>
+          <p:cNvPr id="3" name="Content Placeholder 2">
+            <a:extLst>
+              <a:ext uri="{FF2B5EF4-FFF2-40B4-BE49-F238E27FC236}">
+                <a16:creationId xmlns:a16="http://schemas.microsoft.com/office/drawing/2014/main" id="{EA132EBD-AFE5-BD7B-A3E0-841A4C09136C}"/>
+              </a:ext>
+            </a:extLst>
+          </p:cNvPr>
+          <p:cNvSpPr>
+            <a:spLocks noGrp="1"/>
+          </p:cNvSpPr>
+          <p:nvPr>
+            <p:ph idx="1"/>
+          </p:nvPr>
+        </p:nvSpPr>
+        <p:spPr/>
+        <p:txBody>
+          <a:bodyPr/>
+          <a:lstStyle/>
+          <a:p>
+            <a:r>
+              <a:rPr lang="en-US" b="1" dirty="0"/>
+              <a:t>H</a:t>
+            </a:r>
+            <a:r>
+              <a:rPr lang="en-US" dirty="0"/>
+              <a:t> : impossible</a:t>
+            </a:r>
+          </a:p>
+          <a:p>
+            <a:r>
+              <a:rPr lang="en-US" dirty="0" err="1"/>
+              <a:t>Asymetry</a:t>
+            </a:r>
+            <a:r>
+              <a:rPr lang="en-US" dirty="0"/>
+              <a:t> in X- and Z-type stabilizers (|S</a:t>
+            </a:r>
+            <a:r>
+              <a:rPr lang="en-US" baseline="-25000" dirty="0"/>
+              <a:t>X</a:t>
+            </a:r>
+            <a:r>
+              <a:rPr lang="en-US" dirty="0"/>
+              <a:t>| = 6, |S</a:t>
+            </a:r>
+            <a:r>
+              <a:rPr lang="en-US" baseline="-25000" dirty="0"/>
+              <a:t>Z</a:t>
+            </a:r>
+            <a:r>
+              <a:rPr lang="en-US" dirty="0"/>
+              <a:t>| = 2) </a:t>
+            </a:r>
+          </a:p>
+          <a:p>
+            <a:r>
+              <a:rPr lang="en-US" dirty="0"/>
+              <a:t>H</a:t>
+            </a:r>
+            <a:r>
+              <a:rPr lang="en-US" baseline="30000" dirty="0"/>
+              <a:t>⨷9</a:t>
+            </a:r>
+            <a:r>
+              <a:rPr lang="en-US" dirty="0"/>
+              <a:t> does not preserve the code space</a:t>
+            </a:r>
+          </a:p>
+          <a:p>
+            <a:endParaRPr lang="en-US" dirty="0"/>
+          </a:p>
+          <a:p>
+            <a:r>
+              <a:rPr lang="en-US" dirty="0"/>
+              <a:t>Needs non-transversal Clifford/ancilla implementation</a:t>
+            </a:r>
+          </a:p>
+        </p:txBody>
+      </p:sp>
+    </p:spTree>
+    <p:extLst>
+      <p:ext uri="{BB962C8B-B14F-4D97-AF65-F5344CB8AC3E}">
+        <p14:creationId xmlns:p14="http://schemas.microsoft.com/office/powerpoint/2010/main" val="3763106447"/>
+      </p:ext>
+    </p:extLst>
+  </p:cSld>
+  <p:clrMapOvr>
+    <a:masterClrMapping/>
+  </p:clrMapOvr>
+</p:sld>
+</file>
+
+<file path=ppt/slides/slide8.xml><?xml version="1.0" encoding="utf-8"?>
+<p:sld xmlns:a="http://schemas.openxmlformats.org/drawingml/2006/main" xmlns:r="http://schemas.openxmlformats.org/officeDocument/2006/relationships" xmlns:p="http://schemas.openxmlformats.org/presentationml/2006/main">
+  <p:cSld>
+    <p:spTree>
+      <p:nvGrpSpPr>
+        <p:cNvPr id="1" name=""/>
+        <p:cNvGrpSpPr/>
+        <p:nvPr/>
+      </p:nvGrpSpPr>
+      <p:grpSpPr>
+        <a:xfrm>
+          <a:off x="0" y="0"/>
+          <a:ext cx="0" cy="0"/>
+          <a:chOff x="0" y="0"/>
+          <a:chExt cx="0" cy="0"/>
+        </a:xfrm>
+      </p:grpSpPr>
+      <p:sp>
+        <p:nvSpPr>
+          <p:cNvPr id="2" name="Title 1">
+            <a:extLst>
+              <a:ext uri="{FF2B5EF4-FFF2-40B4-BE49-F238E27FC236}">
                 <a16:creationId xmlns:a16="http://schemas.microsoft.com/office/drawing/2014/main" id="{4BB6FC8A-CA9C-E458-A8FE-B18DAD2F18C8}"/>
               </a:ext>
             </a:extLst>
@@ -6373,7 +6638,7 @@
 </p:sld>
 </file>
 
-<file path=ppt/slides/slide8.xml><?xml version="1.0" encoding="utf-8"?>
+<file path=ppt/slides/slide9.xml><?xml version="1.0" encoding="utf-8"?>
 <p:sld xmlns:a="http://schemas.openxmlformats.org/drawingml/2006/main" xmlns:r="http://schemas.openxmlformats.org/officeDocument/2006/relationships" xmlns:p="http://schemas.openxmlformats.org/presentationml/2006/main">
   <p:cSld>
     <p:spTree>
@@ -6480,122 +6745,6 @@
     <p:extLst>
       <p:ext uri="{BB962C8B-B14F-4D97-AF65-F5344CB8AC3E}">
         <p14:creationId xmlns:p14="http://schemas.microsoft.com/office/powerpoint/2010/main" val="446567162"/>
-      </p:ext>
-    </p:extLst>
-  </p:cSld>
-  <p:clrMapOvr>
-    <a:masterClrMapping/>
-  </p:clrMapOvr>
-</p:sld>
-</file>
-
-<file path=ppt/slides/slide9.xml><?xml version="1.0" encoding="utf-8"?>
-<p:sld xmlns:a="http://schemas.openxmlformats.org/drawingml/2006/main" xmlns:r="http://schemas.openxmlformats.org/officeDocument/2006/relationships" xmlns:p="http://schemas.openxmlformats.org/presentationml/2006/main">
-  <p:cSld>
-    <p:spTree>
-      <p:nvGrpSpPr>
-        <p:cNvPr id="1" name=""/>
-        <p:cNvGrpSpPr/>
-        <p:nvPr/>
-      </p:nvGrpSpPr>
-      <p:grpSpPr>
-        <a:xfrm>
-          <a:off x="0" y="0"/>
-          <a:ext cx="0" cy="0"/>
-          <a:chOff x="0" y="0"/>
-          <a:chExt cx="0" cy="0"/>
-        </a:xfrm>
-      </p:grpSpPr>
-      <p:sp>
-        <p:nvSpPr>
-          <p:cNvPr id="2" name="Title 1">
-            <a:extLst>
-              <a:ext uri="{FF2B5EF4-FFF2-40B4-BE49-F238E27FC236}">
-                <a16:creationId xmlns:a16="http://schemas.microsoft.com/office/drawing/2014/main" id="{D3E941D2-CC56-25E0-32A2-B13AEE5825DB}"/>
-              </a:ext>
-            </a:extLst>
-          </p:cNvPr>
-          <p:cNvSpPr>
-            <a:spLocks noGrp="1"/>
-          </p:cNvSpPr>
-          <p:nvPr>
-            <p:ph type="title"/>
-          </p:nvPr>
-        </p:nvSpPr>
-        <p:spPr/>
-        <p:txBody>
-          <a:bodyPr/>
-          <a:lstStyle/>
-          <a:p>
-            <a:r>
-              <a:rPr lang="en-US" dirty="0"/>
-              <a:t>Correctable errors 3/4</a:t>
-            </a:r>
-          </a:p>
-        </p:txBody>
-      </p:sp>
-      <p:sp>
-        <p:nvSpPr>
-          <p:cNvPr id="3" name="Content Placeholder 2">
-            <a:extLst>
-              <a:ext uri="{FF2B5EF4-FFF2-40B4-BE49-F238E27FC236}">
-                <a16:creationId xmlns:a16="http://schemas.microsoft.com/office/drawing/2014/main" id="{49605DB2-4072-BE93-38B8-A348007E9394}"/>
-              </a:ext>
-            </a:extLst>
-          </p:cNvPr>
-          <p:cNvSpPr>
-            <a:spLocks noGrp="1"/>
-          </p:cNvSpPr>
-          <p:nvPr>
-            <p:ph idx="1"/>
-          </p:nvPr>
-        </p:nvSpPr>
-        <p:spPr/>
-        <p:txBody>
-          <a:bodyPr/>
-          <a:lstStyle/>
-          <a:p>
-            <a:r>
-              <a:rPr lang="en-US" dirty="0"/>
-              <a:t>X in different blocks (up to 3)</a:t>
-            </a:r>
-          </a:p>
-        </p:txBody>
-      </p:sp>
-      <p:pic>
-        <p:nvPicPr>
-          <p:cNvPr id="4" name="Picture 3">
-            <a:extLst>
-              <a:ext uri="{FF2B5EF4-FFF2-40B4-BE49-F238E27FC236}">
-                <a16:creationId xmlns:a16="http://schemas.microsoft.com/office/drawing/2014/main" id="{92581A41-4BDA-14DF-09C7-568F75C73326}"/>
-              </a:ext>
-            </a:extLst>
-          </p:cNvPr>
-          <p:cNvPicPr>
-            <a:picLocks noChangeAspect="1"/>
-          </p:cNvPicPr>
-          <p:nvPr/>
-        </p:nvPicPr>
-        <p:blipFill>
-          <a:blip r:embed="rId2"/>
-          <a:stretch>
-            <a:fillRect/>
-          </a:stretch>
-        </p:blipFill>
-        <p:spPr>
-          <a:xfrm>
-            <a:off x="4419600" y="2524604"/>
-            <a:ext cx="7772400" cy="4333396"/>
-          </a:xfrm>
-          <a:prstGeom prst="rect">
-            <a:avLst/>
-          </a:prstGeom>
-        </p:spPr>
-      </p:pic>
-    </p:spTree>
-    <p:extLst>
-      <p:ext uri="{BB962C8B-B14F-4D97-AF65-F5344CB8AC3E}">
-        <p14:creationId xmlns:p14="http://schemas.microsoft.com/office/powerpoint/2010/main" val="2344972671"/>
       </p:ext>
     </p:extLst>
   </p:cSld>

</xml_diff>